<commit_message>
Update weekly update slides
</commit_message>
<xml_diff>
--- a/linsley_postdoc/presentations/weekly_meetings/12_14_23.pptx
+++ b/linsley_postdoc/presentations/weekly_meetings/12_14_23.pptx
@@ -219,7 +219,7 @@
           <a:p>
             <a:fld id="{E933A773-0DCE-3544-BB67-D5FA58DF903C}" type="datetimeFigureOut">
               <a:rPr lang="en-US" smtClean="0"/>
-              <a:t>12/13/23</a:t>
+              <a:t>12/14/23</a:t>
             </a:fld>
             <a:endParaRPr lang="en-US"/>
           </a:p>
@@ -921,6 +921,34 @@
               <a:t>). This group of drug-exposed patients without colitis was evenly split between patients who had or did not have inflammation of the small intestine (enteritis)</a:t>
             </a:r>
           </a:p>
+          <a:p>
+            <a:endParaRPr lang="en-US" b="0" i="0" u="none" strike="noStrike" dirty="0">
+              <a:solidFill>
+                <a:srgbClr val="212121"/>
+              </a:solidFill>
+              <a:effectLst/>
+              <a:latin typeface="Cambria" panose="02040503050406030204" pitchFamily="18" charset="0"/>
+            </a:endParaRPr>
+          </a:p>
+          <a:p>
+            <a:r>
+              <a:rPr lang="en-US" b="0" i="0" u="none" strike="noStrike" dirty="0">
+                <a:solidFill>
+                  <a:srgbClr val="E2EEFF"/>
+                </a:solidFill>
+                <a:effectLst/>
+                <a:latin typeface="Google Sans"/>
+              </a:rPr>
+              <a:t>Enteritis is inflammation of the small intestine, while colitis is inflammation of the colon</a:t>
+            </a:r>
+            <a:endParaRPr lang="en-US" b="0" i="0" u="none" strike="noStrike" dirty="0">
+              <a:solidFill>
+                <a:srgbClr val="212121"/>
+              </a:solidFill>
+              <a:effectLst/>
+              <a:latin typeface="Cambria" panose="02040503050406030204" pitchFamily="18" charset="0"/>
+            </a:endParaRPr>
+          </a:p>
         </p:txBody>
       </p:sp>
       <p:sp>
@@ -2669,7 +2697,7 @@
           <a:p>
             <a:fld id="{80FC6068-BAFB-FC44-B9D8-F4B3BB105DE6}" type="datetimeFigureOut">
               <a:rPr lang="en-US" smtClean="0"/>
-              <a:t>12/13/23</a:t>
+              <a:t>12/14/23</a:t>
             </a:fld>
             <a:endParaRPr lang="en-US"/>
           </a:p>
@@ -2867,7 +2895,7 @@
           <a:p>
             <a:fld id="{80FC6068-BAFB-FC44-B9D8-F4B3BB105DE6}" type="datetimeFigureOut">
               <a:rPr lang="en-US" smtClean="0"/>
-              <a:t>12/13/23</a:t>
+              <a:t>12/14/23</a:t>
             </a:fld>
             <a:endParaRPr lang="en-US"/>
           </a:p>
@@ -3075,7 +3103,7 @@
           <a:p>
             <a:fld id="{80FC6068-BAFB-FC44-B9D8-F4B3BB105DE6}" type="datetimeFigureOut">
               <a:rPr lang="en-US" smtClean="0"/>
-              <a:t>12/13/23</a:t>
+              <a:t>12/14/23</a:t>
             </a:fld>
             <a:endParaRPr lang="en-US"/>
           </a:p>
@@ -3279,7 +3307,7 @@
           <a:p>
             <a:fld id="{80FC6068-BAFB-FC44-B9D8-F4B3BB105DE6}" type="datetimeFigureOut">
               <a:rPr lang="en-US" smtClean="0"/>
-              <a:t>12/13/23</a:t>
+              <a:t>12/14/23</a:t>
             </a:fld>
             <a:endParaRPr lang="en-US"/>
           </a:p>
@@ -3570,7 +3598,7 @@
           <a:p>
             <a:fld id="{80FC6068-BAFB-FC44-B9D8-F4B3BB105DE6}" type="datetimeFigureOut">
               <a:rPr lang="en-US" smtClean="0"/>
-              <a:t>12/13/23</a:t>
+              <a:t>12/14/23</a:t>
             </a:fld>
             <a:endParaRPr lang="en-US"/>
           </a:p>
@@ -3835,7 +3863,7 @@
           <a:p>
             <a:fld id="{80FC6068-BAFB-FC44-B9D8-F4B3BB105DE6}" type="datetimeFigureOut">
               <a:rPr lang="en-US" smtClean="0"/>
-              <a:t>12/13/23</a:t>
+              <a:t>12/14/23</a:t>
             </a:fld>
             <a:endParaRPr lang="en-US"/>
           </a:p>
@@ -4247,7 +4275,7 @@
           <a:p>
             <a:fld id="{80FC6068-BAFB-FC44-B9D8-F4B3BB105DE6}" type="datetimeFigureOut">
               <a:rPr lang="en-US" smtClean="0"/>
-              <a:t>12/13/23</a:t>
+              <a:t>12/14/23</a:t>
             </a:fld>
             <a:endParaRPr lang="en-US"/>
           </a:p>
@@ -4388,7 +4416,7 @@
           <a:p>
             <a:fld id="{80FC6068-BAFB-FC44-B9D8-F4B3BB105DE6}" type="datetimeFigureOut">
               <a:rPr lang="en-US" smtClean="0"/>
-              <a:t>12/13/23</a:t>
+              <a:t>12/14/23</a:t>
             </a:fld>
             <a:endParaRPr lang="en-US"/>
           </a:p>
@@ -4501,7 +4529,7 @@
           <a:p>
             <a:fld id="{80FC6068-BAFB-FC44-B9D8-F4B3BB105DE6}" type="datetimeFigureOut">
               <a:rPr lang="en-US" smtClean="0"/>
-              <a:t>12/13/23</a:t>
+              <a:t>12/14/23</a:t>
             </a:fld>
             <a:endParaRPr lang="en-US"/>
           </a:p>
@@ -4812,7 +4840,7 @@
           <a:p>
             <a:fld id="{80FC6068-BAFB-FC44-B9D8-F4B3BB105DE6}" type="datetimeFigureOut">
               <a:rPr lang="en-US" smtClean="0"/>
-              <a:t>12/13/23</a:t>
+              <a:t>12/14/23</a:t>
             </a:fld>
             <a:endParaRPr lang="en-US"/>
           </a:p>
@@ -5100,7 +5128,7 @@
           <a:p>
             <a:fld id="{80FC6068-BAFB-FC44-B9D8-F4B3BB105DE6}" type="datetimeFigureOut">
               <a:rPr lang="en-US" smtClean="0"/>
-              <a:t>12/13/23</a:t>
+              <a:t>12/14/23</a:t>
             </a:fld>
             <a:endParaRPr lang="en-US"/>
           </a:p>
@@ -5341,7 +5369,7 @@
           <a:p>
             <a:fld id="{80FC6068-BAFB-FC44-B9D8-F4B3BB105DE6}" type="datetimeFigureOut">
               <a:rPr lang="en-US" smtClean="0"/>
-              <a:t>12/13/23</a:t>
+              <a:t>12/14/23</a:t>
             </a:fld>
             <a:endParaRPr lang="en-US"/>
           </a:p>
@@ -6036,12 +6064,12 @@
         <p:spPr>
           <a:xfrm>
             <a:off x="838199" y="1919288"/>
-            <a:ext cx="5521961" cy="4268152"/>
+            <a:ext cx="4820921" cy="4268152"/>
           </a:xfrm>
         </p:spPr>
         <p:txBody>
           <a:bodyPr>
-            <a:normAutofit/>
+            <a:normAutofit fontScale="92500" lnSpcReduction="10000"/>
           </a:bodyPr>
           <a:lstStyle/>
           <a:p>
@@ -6090,7 +6118,7 @@
                   <a:srgbClr val="212121"/>
                 </a:solidFill>
               </a:rPr>
-              <a:t>HC: n = 8</a:t>
+              <a:t>HC: n = 8 (CT group)</a:t>
             </a:r>
           </a:p>
           <a:p>
@@ -6102,7 +6130,7 @@
                 </a:solidFill>
                 <a:effectLst/>
               </a:rPr>
-              <a:t>ICB no colitis: n = 6</a:t>
+              <a:t>ICB no colitis: n = 6 (NC group)</a:t>
             </a:r>
           </a:p>
           <a:p>
@@ -6113,7 +6141,18 @@
                   <a:srgbClr val="212121"/>
                 </a:solidFill>
               </a:rPr>
-              <a:t>½ enteritis ½ no enteritis</a:t>
+              <a:t>3 enteritis</a:t>
+            </a:r>
+          </a:p>
+          <a:p>
+            <a:pPr lvl="2"/>
+            <a:r>
+              <a:rPr lang="en-US" dirty="0">
+                <a:solidFill>
+                  <a:srgbClr val="212121"/>
+                </a:solidFill>
+              </a:rPr>
+              <a:t>3 no intestinal inflammation</a:t>
             </a:r>
             <a:endParaRPr lang="en-US" b="0" u="none" strike="noStrike" dirty="0">
               <a:solidFill>
@@ -6130,7 +6169,29 @@
                   <a:srgbClr val="212121"/>
                 </a:solidFill>
               </a:rPr>
-              <a:t>ICB colitis: n = 8</a:t>
+              <a:t>ICB colitis: n = 8 (C group)</a:t>
+            </a:r>
+          </a:p>
+          <a:p>
+            <a:pPr lvl="2"/>
+            <a:r>
+              <a:rPr lang="en-US" dirty="0">
+                <a:solidFill>
+                  <a:srgbClr val="212121"/>
+                </a:solidFill>
+              </a:rPr>
+              <a:t>5 enterocolitis</a:t>
+            </a:r>
+          </a:p>
+          <a:p>
+            <a:pPr lvl="2"/>
+            <a:r>
+              <a:rPr lang="en-US" dirty="0">
+                <a:solidFill>
+                  <a:srgbClr val="212121"/>
+                </a:solidFill>
+              </a:rPr>
+              <a:t>3 colitis</a:t>
             </a:r>
           </a:p>
           <a:p>
@@ -6141,7 +6202,7 @@
                   <a:srgbClr val="212121"/>
                 </a:solidFill>
               </a:rPr>
-              <a:t>Hopefully more T cell infiltrates in healthy colon than healthy thyroid</a:t>
+              <a:t>Expecting more T cells in healthy colon than healthy thyroid</a:t>
             </a:r>
           </a:p>
         </p:txBody>
@@ -6168,8 +6229,38 @@
         </p:blipFill>
         <p:spPr>
           <a:xfrm>
-            <a:off x="6469380" y="1919288"/>
+            <a:off x="5496560" y="1919288"/>
             <a:ext cx="5410200" cy="3581400"/>
+          </a:xfrm>
+          <a:prstGeom prst="rect">
+            <a:avLst/>
+          </a:prstGeom>
+        </p:spPr>
+      </p:pic>
+      <p:pic>
+        <p:nvPicPr>
+          <p:cNvPr id="4" name="Picture 3">
+            <a:extLst>
+              <a:ext uri="{FF2B5EF4-FFF2-40B4-BE49-F238E27FC236}">
+                <a16:creationId xmlns:a16="http://schemas.microsoft.com/office/drawing/2014/main" id="{A2001CE5-7C04-60B4-7F38-F39F983932A8}"/>
+              </a:ext>
+            </a:extLst>
+          </p:cNvPr>
+          <p:cNvPicPr>
+            <a:picLocks noChangeAspect="1"/>
+          </p:cNvPicPr>
+          <p:nvPr/>
+        </p:nvPicPr>
+        <p:blipFill>
+          <a:blip r:embed="rId4"/>
+          <a:stretch>
+            <a:fillRect/>
+          </a:stretch>
+        </p:blipFill>
+        <p:spPr>
+          <a:xfrm>
+            <a:off x="10439400" y="0"/>
+            <a:ext cx="1723920" cy="6858000"/>
           </a:xfrm>
           <a:prstGeom prst="rect">
             <a:avLst/>
@@ -8804,7 +8895,7 @@
           <a:p>
             <a:r>
               <a:rPr lang="en-US" dirty="0"/>
-              <a:t>No normal thyroid HC T cells passed QC and had TCR seq data</a:t>
+              <a:t>No normal thyroid HC T cells had TCR seq data</a:t>
             </a:r>
           </a:p>
           <a:p>
@@ -8826,7 +8917,15 @@
             </a:r>
             <a:r>
               <a:rPr lang="en-US" dirty="0"/>
-              <a:t> and HT groups…</a:t>
+              <a:t> and HT groups or what an alternative control would be (besides supplemental healthy thyroid </a:t>
+            </a:r>
+            <a:r>
+              <a:rPr lang="en-US" dirty="0" err="1"/>
+              <a:t>TCRseq</a:t>
+            </a:r>
+            <a:r>
+              <a:rPr lang="en-US" dirty="0"/>
+              <a:t>)…</a:t>
             </a:r>
           </a:p>
         </p:txBody>

</xml_diff>